<commit_message>
Descrição da alteração que você fez
</commit_message>
<xml_diff>
--- a/Paradigmas de linguagens de programação 2.pptx
+++ b/Paradigmas de linguagens de programação 2.pptx
@@ -4283,6 +4283,28 @@
                 <a:hlinkClick r:id="rId4"/>
               </a:rPr>
               <a:t>https://www.dio.me/articles/artigo-de-revisao-caracteristicas-da-programacao-estruturada-e-desenvolvimento-de-algoritmos-atraves-de-divisao-modular-e-refinamentos-sucessivos</a:t>
+            </a:r>
+            <a:endParaRPr lang="pt-BR" dirty="0">
+              <a:solidFill>
+                <a:schemeClr val="tx1">
+                  <a:lumMod val="75000"/>
+                  <a:lumOff val="25000"/>
+                </a:schemeClr>
+              </a:solidFill>
+            </a:endParaRPr>
+          </a:p>
+          <a:p>
+            <a:r>
+              <a:rPr lang="pt-BR" dirty="0">
+                <a:solidFill>
+                  <a:schemeClr val="tx1">
+                    <a:lumMod val="75000"/>
+                    <a:lumOff val="25000"/>
+                  </a:schemeClr>
+                </a:solidFill>
+                <a:hlinkClick r:id="rId5"/>
+              </a:rPr>
+              <a:t>https://github.com/Luishvlima/Paradigmas-de-linguagens-em-Python</a:t>
             </a:r>
             <a:endParaRPr lang="pt-BR" dirty="0">
               <a:solidFill>

</xml_diff>